<commit_message>
determ and props of algs
</commit_message>
<xml_diff>
--- a/algorithms-presentation.pptx
+++ b/algorithms-presentation.pptx
@@ -4,7 +4,13 @@
   <p:sldMasterIdLst>
     <p:sldMasterId id="2147483648" r:id="rId1"/>
   </p:sldMasterIdLst>
-  <p:sldSz cx="9144000" cy="6858000" type="screen4x3"/>
+  <p:sldIdLst>
+    <p:sldId id="256" r:id="rId2"/>
+    <p:sldId id="257" r:id="rId3"/>
+    <p:sldId id="258" r:id="rId4"/>
+    <p:sldId id="259" r:id="rId5"/>
+  </p:sldIdLst>
+  <p:sldSz cx="9144000" cy="5143500" type="screen16x9"/>
   <p:notesSz cx="6858000" cy="9144000"/>
   <p:defaultTextStyle>
     <a:defPPr>
@@ -133,8 +139,8 @@
         </p:nvSpPr>
         <p:spPr>
           <a:xfrm>
-            <a:off x="685800" y="2130425"/>
-            <a:ext cx="7772400" cy="1470025"/>
+            <a:off x="685800" y="1597819"/>
+            <a:ext cx="7772400" cy="1102519"/>
           </a:xfrm>
         </p:spPr>
         <p:txBody>
@@ -161,8 +167,8 @@
         </p:nvSpPr>
         <p:spPr>
           <a:xfrm>
-            <a:off x="1371600" y="3886200"/>
-            <a:ext cx="6400800" cy="1752600"/>
+            <a:off x="1371600" y="2914650"/>
+            <a:ext cx="6400800" cy="1314450"/>
           </a:xfrm>
         </p:spPr>
         <p:txBody>
@@ -285,7 +291,8 @@
           <a:p>
             <a:fld id="{5B106E36-FD25-4E2D-B0AA-010F637433A0}" type="datetimeFigureOut">
               <a:rPr lang="ru-RU" smtClean="0"/>
-              <a:t>03.11.2006</a:t>
+              <a:pPr/>
+              <a:t>06.03.2023</a:t>
             </a:fld>
             <a:endParaRPr lang="ru-RU"/>
           </a:p>
@@ -327,6 +334,7 @@
           <a:p>
             <a:fld id="{725C68B6-61C2-468F-89AB-4B9F7531AA68}" type="slidenum">
               <a:rPr lang="ru-RU" smtClean="0"/>
+              <a:pPr/>
               <a:t>‹#›</a:t>
             </a:fld>
             <a:endParaRPr lang="ru-RU"/>
@@ -450,7 +458,8 @@
           <a:p>
             <a:fld id="{5B106E36-FD25-4E2D-B0AA-010F637433A0}" type="datetimeFigureOut">
               <a:rPr lang="ru-RU" smtClean="0"/>
-              <a:t>03.11.2006</a:t>
+              <a:pPr/>
+              <a:t>06.03.2023</a:t>
             </a:fld>
             <a:endParaRPr lang="ru-RU"/>
           </a:p>
@@ -492,6 +501,7 @@
           <a:p>
             <a:fld id="{725C68B6-61C2-468F-89AB-4B9F7531AA68}" type="slidenum">
               <a:rPr lang="ru-RU" smtClean="0"/>
+              <a:pPr/>
               <a:t>‹#›</a:t>
             </a:fld>
             <a:endParaRPr lang="ru-RU"/>
@@ -535,8 +545,8 @@
         </p:nvSpPr>
         <p:spPr>
           <a:xfrm>
-            <a:off x="6629400" y="274638"/>
-            <a:ext cx="2057400" cy="5851525"/>
+            <a:off x="6629400" y="205979"/>
+            <a:ext cx="2057400" cy="4388644"/>
           </a:xfrm>
         </p:spPr>
         <p:txBody>
@@ -563,8 +573,8 @@
         </p:nvSpPr>
         <p:spPr>
           <a:xfrm>
-            <a:off x="457200" y="274638"/>
-            <a:ext cx="6019800" cy="5851525"/>
+            <a:off x="457200" y="205979"/>
+            <a:ext cx="6019800" cy="4388644"/>
           </a:xfrm>
         </p:spPr>
         <p:txBody>
@@ -625,7 +635,8 @@
           <a:p>
             <a:fld id="{5B106E36-FD25-4E2D-B0AA-010F637433A0}" type="datetimeFigureOut">
               <a:rPr lang="ru-RU" smtClean="0"/>
-              <a:t>03.11.2006</a:t>
+              <a:pPr/>
+              <a:t>06.03.2023</a:t>
             </a:fld>
             <a:endParaRPr lang="ru-RU"/>
           </a:p>
@@ -667,6 +678,7 @@
           <a:p>
             <a:fld id="{725C68B6-61C2-468F-89AB-4B9F7531AA68}" type="slidenum">
               <a:rPr lang="ru-RU" smtClean="0"/>
+              <a:pPr/>
               <a:t>‹#›</a:t>
             </a:fld>
             <a:endParaRPr lang="ru-RU"/>
@@ -790,7 +802,8 @@
           <a:p>
             <a:fld id="{5B106E36-FD25-4E2D-B0AA-010F637433A0}" type="datetimeFigureOut">
               <a:rPr lang="ru-RU" smtClean="0"/>
-              <a:t>03.11.2006</a:t>
+              <a:pPr/>
+              <a:t>06.03.2023</a:t>
             </a:fld>
             <a:endParaRPr lang="ru-RU"/>
           </a:p>
@@ -832,6 +845,7 @@
           <a:p>
             <a:fld id="{725C68B6-61C2-468F-89AB-4B9F7531AA68}" type="slidenum">
               <a:rPr lang="ru-RU" smtClean="0"/>
+              <a:pPr/>
               <a:t>‹#›</a:t>
             </a:fld>
             <a:endParaRPr lang="ru-RU"/>
@@ -875,8 +889,8 @@
         </p:nvSpPr>
         <p:spPr>
           <a:xfrm>
-            <a:off x="722313" y="4406900"/>
-            <a:ext cx="7772400" cy="1362075"/>
+            <a:off x="722313" y="3305176"/>
+            <a:ext cx="7772400" cy="1021556"/>
           </a:xfrm>
         </p:spPr>
         <p:txBody>
@@ -907,8 +921,8 @@
         </p:nvSpPr>
         <p:spPr>
           <a:xfrm>
-            <a:off x="722313" y="2906713"/>
-            <a:ext cx="7772400" cy="1500187"/>
+            <a:off x="722313" y="2180035"/>
+            <a:ext cx="7772400" cy="1125140"/>
           </a:xfrm>
         </p:spPr>
         <p:txBody>
@@ -1031,7 +1045,8 @@
           <a:p>
             <a:fld id="{5B106E36-FD25-4E2D-B0AA-010F637433A0}" type="datetimeFigureOut">
               <a:rPr lang="ru-RU" smtClean="0"/>
-              <a:t>03.11.2006</a:t>
+              <a:pPr/>
+              <a:t>06.03.2023</a:t>
             </a:fld>
             <a:endParaRPr lang="ru-RU"/>
           </a:p>
@@ -1073,6 +1088,7 @@
           <a:p>
             <a:fld id="{725C68B6-61C2-468F-89AB-4B9F7531AA68}" type="slidenum">
               <a:rPr lang="ru-RU" smtClean="0"/>
+              <a:pPr/>
               <a:t>‹#›</a:t>
             </a:fld>
             <a:endParaRPr lang="ru-RU"/>
@@ -1139,8 +1155,8 @@
         </p:nvSpPr>
         <p:spPr>
           <a:xfrm>
-            <a:off x="457200" y="1600200"/>
-            <a:ext cx="4038600" cy="4525963"/>
+            <a:off x="457200" y="1200151"/>
+            <a:ext cx="4038600" cy="3394472"/>
           </a:xfrm>
         </p:spPr>
         <p:txBody>
@@ -1224,8 +1240,8 @@
         </p:nvSpPr>
         <p:spPr>
           <a:xfrm>
-            <a:off x="4648200" y="1600200"/>
-            <a:ext cx="4038600" cy="4525963"/>
+            <a:off x="4648200" y="1200151"/>
+            <a:ext cx="4038600" cy="3394472"/>
           </a:xfrm>
         </p:spPr>
         <p:txBody>
@@ -1314,7 +1330,8 @@
           <a:p>
             <a:fld id="{5B106E36-FD25-4E2D-B0AA-010F637433A0}" type="datetimeFigureOut">
               <a:rPr lang="ru-RU" smtClean="0"/>
-              <a:t>03.11.2006</a:t>
+              <a:pPr/>
+              <a:t>06.03.2023</a:t>
             </a:fld>
             <a:endParaRPr lang="ru-RU"/>
           </a:p>
@@ -1356,6 +1373,7 @@
           <a:p>
             <a:fld id="{725C68B6-61C2-468F-89AB-4B9F7531AA68}" type="slidenum">
               <a:rPr lang="ru-RU" smtClean="0"/>
+              <a:pPr/>
               <a:t>‹#›</a:t>
             </a:fld>
             <a:endParaRPr lang="ru-RU"/>
@@ -1426,8 +1444,8 @@
         </p:nvSpPr>
         <p:spPr>
           <a:xfrm>
-            <a:off x="457200" y="1535113"/>
-            <a:ext cx="4040188" cy="639762"/>
+            <a:off x="457200" y="1151335"/>
+            <a:ext cx="4040188" cy="479822"/>
           </a:xfrm>
         </p:spPr>
         <p:txBody>
@@ -1491,8 +1509,8 @@
         </p:nvSpPr>
         <p:spPr>
           <a:xfrm>
-            <a:off x="457200" y="2174875"/>
-            <a:ext cx="4040188" cy="3951288"/>
+            <a:off x="457200" y="1631156"/>
+            <a:ext cx="4040188" cy="2963466"/>
           </a:xfrm>
         </p:spPr>
         <p:txBody>
@@ -1576,8 +1594,8 @@
         </p:nvSpPr>
         <p:spPr>
           <a:xfrm>
-            <a:off x="4645025" y="1535113"/>
-            <a:ext cx="4041775" cy="639762"/>
+            <a:off x="4645026" y="1151335"/>
+            <a:ext cx="4041775" cy="479822"/>
           </a:xfrm>
         </p:spPr>
         <p:txBody>
@@ -1641,8 +1659,8 @@
         </p:nvSpPr>
         <p:spPr>
           <a:xfrm>
-            <a:off x="4645025" y="2174875"/>
-            <a:ext cx="4041775" cy="3951288"/>
+            <a:off x="4645026" y="1631156"/>
+            <a:ext cx="4041775" cy="2963466"/>
           </a:xfrm>
         </p:spPr>
         <p:txBody>
@@ -1731,7 +1749,8 @@
           <a:p>
             <a:fld id="{5B106E36-FD25-4E2D-B0AA-010F637433A0}" type="datetimeFigureOut">
               <a:rPr lang="ru-RU" smtClean="0"/>
-              <a:t>03.11.2006</a:t>
+              <a:pPr/>
+              <a:t>06.03.2023</a:t>
             </a:fld>
             <a:endParaRPr lang="ru-RU"/>
           </a:p>
@@ -1773,6 +1792,7 @@
           <a:p>
             <a:fld id="{725C68B6-61C2-468F-89AB-4B9F7531AA68}" type="slidenum">
               <a:rPr lang="ru-RU" smtClean="0"/>
+              <a:pPr/>
               <a:t>‹#›</a:t>
             </a:fld>
             <a:endParaRPr lang="ru-RU"/>
@@ -1844,7 +1864,8 @@
           <a:p>
             <a:fld id="{5B106E36-FD25-4E2D-B0AA-010F637433A0}" type="datetimeFigureOut">
               <a:rPr lang="ru-RU" smtClean="0"/>
-              <a:t>03.11.2006</a:t>
+              <a:pPr/>
+              <a:t>06.03.2023</a:t>
             </a:fld>
             <a:endParaRPr lang="ru-RU"/>
           </a:p>
@@ -1886,6 +1907,7 @@
           <a:p>
             <a:fld id="{725C68B6-61C2-468F-89AB-4B9F7531AA68}" type="slidenum">
               <a:rPr lang="ru-RU" smtClean="0"/>
+              <a:pPr/>
               <a:t>‹#›</a:t>
             </a:fld>
             <a:endParaRPr lang="ru-RU"/>
@@ -1934,7 +1956,8 @@
           <a:p>
             <a:fld id="{5B106E36-FD25-4E2D-B0AA-010F637433A0}" type="datetimeFigureOut">
               <a:rPr lang="ru-RU" smtClean="0"/>
-              <a:t>03.11.2006</a:t>
+              <a:pPr/>
+              <a:t>06.03.2023</a:t>
             </a:fld>
             <a:endParaRPr lang="ru-RU"/>
           </a:p>
@@ -1976,6 +1999,7 @@
           <a:p>
             <a:fld id="{725C68B6-61C2-468F-89AB-4B9F7531AA68}" type="slidenum">
               <a:rPr lang="ru-RU" smtClean="0"/>
+              <a:pPr/>
               <a:t>‹#›</a:t>
             </a:fld>
             <a:endParaRPr lang="ru-RU"/>
@@ -2019,8 +2043,8 @@
         </p:nvSpPr>
         <p:spPr>
           <a:xfrm>
-            <a:off x="457200" y="273050"/>
-            <a:ext cx="3008313" cy="1162050"/>
+            <a:off x="457201" y="204787"/>
+            <a:ext cx="3008313" cy="871538"/>
           </a:xfrm>
         </p:spPr>
         <p:txBody>
@@ -2051,8 +2075,8 @@
         </p:nvSpPr>
         <p:spPr>
           <a:xfrm>
-            <a:off x="3575050" y="273050"/>
-            <a:ext cx="5111750" cy="5853113"/>
+            <a:off x="3575050" y="204788"/>
+            <a:ext cx="5111750" cy="4389835"/>
           </a:xfrm>
         </p:spPr>
         <p:txBody>
@@ -2136,8 +2160,8 @@
         </p:nvSpPr>
         <p:spPr>
           <a:xfrm>
-            <a:off x="457200" y="1435100"/>
-            <a:ext cx="3008313" cy="4691063"/>
+            <a:off x="457201" y="1076326"/>
+            <a:ext cx="3008313" cy="3518297"/>
           </a:xfrm>
         </p:spPr>
         <p:txBody>
@@ -2206,7 +2230,8 @@
           <a:p>
             <a:fld id="{5B106E36-FD25-4E2D-B0AA-010F637433A0}" type="datetimeFigureOut">
               <a:rPr lang="ru-RU" smtClean="0"/>
-              <a:t>03.11.2006</a:t>
+              <a:pPr/>
+              <a:t>06.03.2023</a:t>
             </a:fld>
             <a:endParaRPr lang="ru-RU"/>
           </a:p>
@@ -2248,6 +2273,7 @@
           <a:p>
             <a:fld id="{725C68B6-61C2-468F-89AB-4B9F7531AA68}" type="slidenum">
               <a:rPr lang="ru-RU" smtClean="0"/>
+              <a:pPr/>
               <a:t>‹#›</a:t>
             </a:fld>
             <a:endParaRPr lang="ru-RU"/>
@@ -2291,8 +2317,8 @@
         </p:nvSpPr>
         <p:spPr>
           <a:xfrm>
-            <a:off x="1792288" y="4800600"/>
-            <a:ext cx="5486400" cy="566738"/>
+            <a:off x="1792288" y="3600450"/>
+            <a:ext cx="5486400" cy="425054"/>
           </a:xfrm>
         </p:spPr>
         <p:txBody>
@@ -2323,8 +2349,8 @@
         </p:nvSpPr>
         <p:spPr>
           <a:xfrm>
-            <a:off x="1792288" y="612775"/>
-            <a:ext cx="5486400" cy="4114800"/>
+            <a:off x="1792288" y="459581"/>
+            <a:ext cx="5486400" cy="3086100"/>
           </a:xfrm>
         </p:spPr>
         <p:txBody>
@@ -2384,8 +2410,8 @@
         </p:nvSpPr>
         <p:spPr>
           <a:xfrm>
-            <a:off x="1792288" y="5367338"/>
-            <a:ext cx="5486400" cy="804862"/>
+            <a:off x="1792288" y="4025503"/>
+            <a:ext cx="5486400" cy="603647"/>
           </a:xfrm>
         </p:spPr>
         <p:txBody>
@@ -2454,7 +2480,8 @@
           <a:p>
             <a:fld id="{5B106E36-FD25-4E2D-B0AA-010F637433A0}" type="datetimeFigureOut">
               <a:rPr lang="ru-RU" smtClean="0"/>
-              <a:t>03.11.2006</a:t>
+              <a:pPr/>
+              <a:t>06.03.2023</a:t>
             </a:fld>
             <a:endParaRPr lang="ru-RU"/>
           </a:p>
@@ -2496,6 +2523,7 @@
           <a:p>
             <a:fld id="{725C68B6-61C2-468F-89AB-4B9F7531AA68}" type="slidenum">
               <a:rPr lang="ru-RU" smtClean="0"/>
+              <a:pPr/>
               <a:t>‹#›</a:t>
             </a:fld>
             <a:endParaRPr lang="ru-RU"/>
@@ -2544,8 +2572,8 @@
         </p:nvSpPr>
         <p:spPr>
           <a:xfrm>
-            <a:off x="457200" y="274638"/>
-            <a:ext cx="8229600" cy="1143000"/>
+            <a:off x="457200" y="205979"/>
+            <a:ext cx="8229600" cy="857250"/>
           </a:xfrm>
           <a:prstGeom prst="rect">
             <a:avLst/>
@@ -2577,8 +2605,8 @@
         </p:nvSpPr>
         <p:spPr>
           <a:xfrm>
-            <a:off x="457200" y="1600200"/>
-            <a:ext cx="8229600" cy="4525963"/>
+            <a:off x="457200" y="1200151"/>
+            <a:ext cx="8229600" cy="3394472"/>
           </a:xfrm>
           <a:prstGeom prst="rect">
             <a:avLst/>
@@ -2639,8 +2667,8 @@
         </p:nvSpPr>
         <p:spPr>
           <a:xfrm>
-            <a:off x="457200" y="6356350"/>
-            <a:ext cx="2133600" cy="365125"/>
+            <a:off x="457200" y="4767263"/>
+            <a:ext cx="2133600" cy="273844"/>
           </a:xfrm>
           <a:prstGeom prst="rect">
             <a:avLst/>
@@ -2662,7 +2690,8 @@
           <a:p>
             <a:fld id="{5B106E36-FD25-4E2D-B0AA-010F637433A0}" type="datetimeFigureOut">
               <a:rPr lang="ru-RU" smtClean="0"/>
-              <a:t>03.11.2006</a:t>
+              <a:pPr/>
+              <a:t>06.03.2023</a:t>
             </a:fld>
             <a:endParaRPr lang="ru-RU"/>
           </a:p>
@@ -2680,8 +2709,8 @@
         </p:nvSpPr>
         <p:spPr>
           <a:xfrm>
-            <a:off x="3124200" y="6356350"/>
-            <a:ext cx="2895600" cy="365125"/>
+            <a:off x="3124200" y="4767263"/>
+            <a:ext cx="2895600" cy="273844"/>
           </a:xfrm>
           <a:prstGeom prst="rect">
             <a:avLst/>
@@ -2717,8 +2746,8 @@
         </p:nvSpPr>
         <p:spPr>
           <a:xfrm>
-            <a:off x="6553200" y="6356350"/>
-            <a:ext cx="2133600" cy="365125"/>
+            <a:off x="6553200" y="4767263"/>
+            <a:ext cx="2133600" cy="273844"/>
           </a:xfrm>
           <a:prstGeom prst="rect">
             <a:avLst/>
@@ -2740,6 +2769,7 @@
           <a:p>
             <a:fld id="{725C68B6-61C2-468F-89AB-4B9F7531AA68}" type="slidenum">
               <a:rPr lang="ru-RU" smtClean="0"/>
+              <a:pPr/>
               <a:t>‹#›</a:t>
             </a:fld>
             <a:endParaRPr lang="ru-RU"/>
@@ -3013,6 +3043,809 @@
     </p:otherStyle>
   </p:txStyles>
 </p:sldMaster>
+</file>
+
+<file path=ppt/slides/slide1.xml><?xml version="1.0" encoding="utf-8"?>
+<p:sld xmlns:a="http://schemas.openxmlformats.org/drawingml/2006/main" xmlns:r="http://schemas.openxmlformats.org/officeDocument/2006/relationships" xmlns:p="http://schemas.openxmlformats.org/presentationml/2006/main">
+  <p:cSld>
+    <p:spTree>
+      <p:nvGrpSpPr>
+        <p:cNvPr id="1" name=""/>
+        <p:cNvGrpSpPr/>
+        <p:nvPr/>
+      </p:nvGrpSpPr>
+      <p:grpSpPr>
+        <a:xfrm>
+          <a:off x="0" y="0"/>
+          <a:ext cx="0" cy="0"/>
+          <a:chOff x="0" y="0"/>
+          <a:chExt cx="0" cy="0"/>
+        </a:xfrm>
+      </p:grpSpPr>
+      <p:sp>
+        <p:nvSpPr>
+          <p:cNvPr id="2" name="Заголовок 1"/>
+          <p:cNvSpPr>
+            <a:spLocks noGrp="1"/>
+          </p:cNvSpPr>
+          <p:nvPr>
+            <p:ph type="ctrTitle"/>
+          </p:nvPr>
+        </p:nvSpPr>
+        <p:spPr>
+          <a:xfrm>
+            <a:off x="214282" y="2928940"/>
+            <a:ext cx="8715436" cy="1831187"/>
+          </a:xfrm>
+        </p:spPr>
+        <p:txBody>
+          <a:bodyPr>
+            <a:normAutofit fontScale="90000"/>
+          </a:bodyPr>
+          <a:lstStyle/>
+          <a:p>
+            <a:r>
+              <a:rPr lang="ru-RU" dirty="0" smtClean="0"/>
+              <a:t>Презентация основана на информации с сайта </a:t>
+            </a:r>
+            <a:r>
+              <a:rPr lang="en-US" dirty="0" smtClean="0">
+                <a:hlinkClick r:id="rId2"/>
+              </a:rPr>
+              <a:t>pro-prof.com</a:t>
+            </a:r>
+            <a:r>
+              <a:rPr lang="ru-RU" dirty="0" smtClean="0"/>
+              <a:t>, а также литературе из списка в конце документа.</a:t>
+            </a:r>
+            <a:endParaRPr lang="ru-RU" dirty="0"/>
+          </a:p>
+        </p:txBody>
+      </p:sp>
+    </p:spTree>
+  </p:cSld>
+  <p:clrMapOvr>
+    <a:masterClrMapping/>
+  </p:clrMapOvr>
+</p:sld>
+</file>
+
+<file path=ppt/slides/slide2.xml><?xml version="1.0" encoding="utf-8"?>
+<p:sld xmlns:a="http://schemas.openxmlformats.org/drawingml/2006/main" xmlns:r="http://schemas.openxmlformats.org/officeDocument/2006/relationships" xmlns:p="http://schemas.openxmlformats.org/presentationml/2006/main">
+  <p:cSld>
+    <p:spTree>
+      <p:nvGrpSpPr>
+        <p:cNvPr id="1" name=""/>
+        <p:cNvGrpSpPr/>
+        <p:nvPr/>
+      </p:nvGrpSpPr>
+      <p:grpSpPr>
+        <a:xfrm>
+          <a:off x="0" y="0"/>
+          <a:ext cx="0" cy="0"/>
+          <a:chOff x="0" y="0"/>
+          <a:chExt cx="0" cy="0"/>
+        </a:xfrm>
+      </p:grpSpPr>
+      <p:sp>
+        <p:nvSpPr>
+          <p:cNvPr id="2" name="Заголовок 1"/>
+          <p:cNvSpPr>
+            <a:spLocks noGrp="1"/>
+          </p:cNvSpPr>
+          <p:nvPr>
+            <p:ph type="title"/>
+          </p:nvPr>
+        </p:nvSpPr>
+        <p:spPr/>
+        <p:txBody>
+          <a:bodyPr/>
+          <a:lstStyle/>
+          <a:p>
+            <a:r>
+              <a:rPr lang="ru-RU" dirty="0" smtClean="0"/>
+              <a:t>Понятие алгоритма</a:t>
+            </a:r>
+            <a:endParaRPr lang="ru-RU" dirty="0"/>
+          </a:p>
+        </p:txBody>
+      </p:sp>
+      <p:sp>
+        <p:nvSpPr>
+          <p:cNvPr id="3" name="Содержимое 2"/>
+          <p:cNvSpPr>
+            <a:spLocks noGrp="1"/>
+          </p:cNvSpPr>
+          <p:nvPr>
+            <p:ph idx="1"/>
+          </p:nvPr>
+        </p:nvSpPr>
+        <p:spPr>
+          <a:xfrm>
+            <a:off x="214282" y="1200150"/>
+            <a:ext cx="8715436" cy="3943349"/>
+          </a:xfrm>
+        </p:spPr>
+        <p:txBody>
+          <a:bodyPr>
+            <a:normAutofit fontScale="70000" lnSpcReduction="20000"/>
+          </a:bodyPr>
+          <a:lstStyle/>
+          <a:p>
+            <a:pPr fontAlgn="base"/>
+            <a:r>
+              <a:rPr lang="ru-RU" dirty="0" smtClean="0"/>
+              <a:t>«процедура, которая принимает любой из возможных входных экземпляров задачи и преобразует его в соответствии с требованиями, указанными в условии задачи» [1];</a:t>
+            </a:r>
+          </a:p>
+          <a:p>
+            <a:pPr fontAlgn="base"/>
+            <a:r>
+              <a:rPr lang="ru-RU" dirty="0" smtClean="0"/>
+              <a:t>«точное предписание, однозначно определяющее вычислительный процесс, ведущий от варьируемых начальных данных к искомому результату» [2];</a:t>
+            </a:r>
+          </a:p>
+          <a:p>
+            <a:pPr fontAlgn="base"/>
+            <a:r>
+              <a:rPr lang="ru-RU" dirty="0" smtClean="0"/>
+              <a:t>«конечный набор правил, однозначно раскрывающих содержание и последовательность выполнения операций для систематического решения определенного класса задач за конечное число шагов» [3];</a:t>
+            </a:r>
+          </a:p>
+          <a:p>
+            <a:pPr fontAlgn="base"/>
+            <a:r>
+              <a:rPr lang="ru-RU" dirty="0" smtClean="0"/>
+              <a:t>«A </a:t>
+            </a:r>
+            <a:r>
+              <a:rPr lang="ru-RU" dirty="0" err="1" smtClean="0"/>
+              <a:t>computable</a:t>
+            </a:r>
+            <a:r>
+              <a:rPr lang="ru-RU" dirty="0" smtClean="0"/>
+              <a:t> </a:t>
+            </a:r>
+            <a:r>
+              <a:rPr lang="ru-RU" dirty="0" err="1" smtClean="0"/>
+              <a:t>set</a:t>
+            </a:r>
+            <a:r>
+              <a:rPr lang="ru-RU" dirty="0" smtClean="0"/>
+              <a:t> </a:t>
+            </a:r>
+            <a:r>
+              <a:rPr lang="ru-RU" dirty="0" err="1" smtClean="0"/>
+              <a:t>of</a:t>
+            </a:r>
+            <a:r>
+              <a:rPr lang="ru-RU" dirty="0" smtClean="0"/>
+              <a:t> </a:t>
+            </a:r>
+            <a:r>
+              <a:rPr lang="ru-RU" dirty="0" err="1" smtClean="0"/>
+              <a:t>steps</a:t>
+            </a:r>
+            <a:r>
+              <a:rPr lang="ru-RU" dirty="0" smtClean="0"/>
+              <a:t> </a:t>
+            </a:r>
+            <a:r>
+              <a:rPr lang="ru-RU" dirty="0" err="1" smtClean="0"/>
+              <a:t>to</a:t>
+            </a:r>
+            <a:r>
+              <a:rPr lang="ru-RU" dirty="0" smtClean="0"/>
+              <a:t> </a:t>
+            </a:r>
+            <a:r>
+              <a:rPr lang="ru-RU" dirty="0" err="1" smtClean="0"/>
+              <a:t>achieve</a:t>
+            </a:r>
+            <a:r>
+              <a:rPr lang="ru-RU" dirty="0" smtClean="0"/>
+              <a:t> </a:t>
+            </a:r>
+            <a:r>
+              <a:rPr lang="ru-RU" dirty="0" err="1" smtClean="0"/>
+              <a:t>a</a:t>
+            </a:r>
+            <a:r>
+              <a:rPr lang="ru-RU" dirty="0" smtClean="0"/>
+              <a:t> </a:t>
+            </a:r>
+            <a:r>
+              <a:rPr lang="ru-RU" dirty="0" err="1" smtClean="0"/>
+              <a:t>desired</a:t>
+            </a:r>
+            <a:r>
+              <a:rPr lang="ru-RU" dirty="0" smtClean="0"/>
+              <a:t> </a:t>
+            </a:r>
+            <a:r>
+              <a:rPr lang="ru-RU" dirty="0" err="1" smtClean="0"/>
+              <a:t>result</a:t>
+            </a:r>
+            <a:r>
+              <a:rPr lang="ru-RU" dirty="0" smtClean="0"/>
+              <a:t>» [4].</a:t>
+            </a:r>
+            <a:endParaRPr lang="ru-RU" dirty="0"/>
+          </a:p>
+        </p:txBody>
+      </p:sp>
+    </p:spTree>
+  </p:cSld>
+  <p:clrMapOvr>
+    <a:masterClrMapping/>
+  </p:clrMapOvr>
+</p:sld>
+</file>
+
+<file path=ppt/slides/slide3.xml><?xml version="1.0" encoding="utf-8"?>
+<p:sld xmlns:a="http://schemas.openxmlformats.org/drawingml/2006/main" xmlns:r="http://schemas.openxmlformats.org/officeDocument/2006/relationships" xmlns:p="http://schemas.openxmlformats.org/presentationml/2006/main">
+  <p:cSld>
+    <p:spTree>
+      <p:nvGrpSpPr>
+        <p:cNvPr id="1" name=""/>
+        <p:cNvGrpSpPr/>
+        <p:nvPr/>
+      </p:nvGrpSpPr>
+      <p:grpSpPr>
+        <a:xfrm>
+          <a:off x="0" y="0"/>
+          <a:ext cx="0" cy="0"/>
+          <a:chOff x="0" y="0"/>
+          <a:chExt cx="0" cy="0"/>
+        </a:xfrm>
+      </p:grpSpPr>
+      <p:sp>
+        <p:nvSpPr>
+          <p:cNvPr id="2" name="Заголовок 1"/>
+          <p:cNvSpPr>
+            <a:spLocks noGrp="1"/>
+          </p:cNvSpPr>
+          <p:nvPr>
+            <p:ph type="title"/>
+          </p:nvPr>
+        </p:nvSpPr>
+        <p:spPr/>
+        <p:txBody>
+          <a:bodyPr/>
+          <a:lstStyle/>
+          <a:p>
+            <a:r>
+              <a:rPr lang="ru-RU" dirty="0" smtClean="0"/>
+              <a:t>Свойства алгоритма </a:t>
+            </a:r>
+            <a:r>
+              <a:rPr lang="en-US" dirty="0" smtClean="0"/>
+              <a:t>[5]</a:t>
+            </a:r>
+            <a:endParaRPr lang="ru-RU" dirty="0"/>
+          </a:p>
+        </p:txBody>
+      </p:sp>
+      <p:sp>
+        <p:nvSpPr>
+          <p:cNvPr id="3" name="Содержимое 2"/>
+          <p:cNvSpPr>
+            <a:spLocks noGrp="1"/>
+          </p:cNvSpPr>
+          <p:nvPr>
+            <p:ph idx="1"/>
+          </p:nvPr>
+        </p:nvSpPr>
+        <p:spPr>
+          <a:xfrm>
+            <a:off x="214282" y="1200150"/>
+            <a:ext cx="8715436" cy="3943350"/>
+          </a:xfrm>
+        </p:spPr>
+        <p:txBody>
+          <a:bodyPr>
+            <a:normAutofit/>
+          </a:bodyPr>
+          <a:lstStyle/>
+          <a:p>
+            <a:pPr fontAlgn="base">
+              <a:buNone/>
+            </a:pPr>
+            <a:r>
+              <a:rPr lang="ru-RU" sz="1400" dirty="0" smtClean="0"/>
+              <a:t>Из определений вытекают свойства алгоритма [5]:</a:t>
+            </a:r>
+          </a:p>
+          <a:p>
+            <a:pPr fontAlgn="base"/>
+            <a:r>
+              <a:rPr lang="ru-RU" sz="1400" b="1" dirty="0" smtClean="0"/>
+              <a:t>дискретность.</a:t>
+            </a:r>
+            <a:r>
+              <a:rPr lang="ru-RU" sz="1400" dirty="0" smtClean="0"/>
+              <a:t> </a:t>
+            </a:r>
+            <a:r>
+              <a:rPr lang="ru-RU" sz="1400" dirty="0" smtClean="0"/>
+              <a:t>Алгоритм </a:t>
+            </a:r>
+            <a:r>
+              <a:rPr lang="ru-RU" sz="1400" dirty="0" smtClean="0"/>
+              <a:t>состоит из отдельных действий или правил. Алгоритм обладает дискретностью, если его можно </a:t>
+            </a:r>
+            <a:r>
+              <a:rPr lang="ru-RU" sz="1400" b="1" dirty="0" smtClean="0"/>
+              <a:t>разделить на отдельные этапы </a:t>
+            </a:r>
+            <a:r>
+              <a:rPr lang="ru-RU" sz="1400" dirty="0" smtClean="0"/>
+              <a:t>(части, команды</a:t>
+            </a:r>
+            <a:r>
+              <a:rPr lang="ru-RU" sz="1400" dirty="0" smtClean="0"/>
+              <a:t>) (определения 3 и 4).</a:t>
+            </a:r>
+          </a:p>
+          <a:p>
+            <a:pPr fontAlgn="base"/>
+            <a:endParaRPr lang="ru-RU" sz="1400" dirty="0" smtClean="0"/>
+          </a:p>
+          <a:p>
+            <a:pPr fontAlgn="base"/>
+            <a:r>
+              <a:rPr lang="ru-RU" sz="1400" b="1" dirty="0" smtClean="0"/>
+              <a:t>детерминированность</a:t>
+            </a:r>
+            <a:r>
+              <a:rPr lang="ru-RU" sz="1400" dirty="0" smtClean="0"/>
+              <a:t> (определенность). </a:t>
+            </a:r>
+            <a:r>
+              <a:rPr lang="ru-RU" sz="1400" dirty="0" smtClean="0"/>
+              <a:t>Для  </a:t>
+            </a:r>
+            <a:r>
+              <a:rPr lang="ru-RU" sz="1400" dirty="0" smtClean="0"/>
+              <a:t>одних и тех же наборов исходных </a:t>
+            </a:r>
+            <a:r>
+              <a:rPr lang="ru-RU" sz="1400" b="1" dirty="0" smtClean="0"/>
+              <a:t>данных </a:t>
+            </a:r>
+            <a:r>
+              <a:rPr lang="ru-RU" sz="1400" b="1" dirty="0" smtClean="0"/>
+              <a:t>алгоритм должен </a:t>
+            </a:r>
+            <a:r>
+              <a:rPr lang="ru-RU" sz="1400" b="1" dirty="0" smtClean="0"/>
+              <a:t>выдавать один и тот же результат</a:t>
+            </a:r>
+            <a:r>
+              <a:rPr lang="ru-RU" sz="1400" dirty="0" smtClean="0"/>
+              <a:t>, т.е. результат однозначно определяется исходными данными </a:t>
+            </a:r>
+            <a:r>
+              <a:rPr lang="ru-RU" sz="1400" dirty="0" smtClean="0"/>
+              <a:t>(определение 3);</a:t>
+            </a:r>
+          </a:p>
+          <a:p>
+            <a:pPr fontAlgn="base"/>
+            <a:endParaRPr lang="ru-RU" sz="1400" dirty="0" smtClean="0"/>
+          </a:p>
+          <a:p>
+            <a:pPr fontAlgn="base"/>
+            <a:r>
+              <a:rPr lang="ru-RU" sz="1400" b="1" dirty="0" smtClean="0"/>
+              <a:t>результативность.</a:t>
+            </a:r>
+            <a:r>
+              <a:rPr lang="ru-RU" sz="1400" dirty="0" smtClean="0"/>
+              <a:t> </a:t>
+            </a:r>
+            <a:r>
+              <a:rPr lang="en-US" sz="1400" dirty="0" smtClean="0"/>
+              <a:t> </a:t>
+            </a:r>
+            <a:r>
+              <a:rPr lang="ru-RU" sz="1400" dirty="0" smtClean="0"/>
+              <a:t>Алгоритм </a:t>
+            </a:r>
+            <a:r>
+              <a:rPr lang="ru-RU" sz="1400" dirty="0" smtClean="0"/>
+              <a:t>должен выдавать результат </a:t>
+            </a:r>
+            <a:r>
+              <a:rPr lang="ru-RU" sz="1400" b="1" dirty="0" smtClean="0"/>
+              <a:t>за конечное число </a:t>
+            </a:r>
+            <a:r>
+              <a:rPr lang="ru-RU" sz="1400" b="1" dirty="0" smtClean="0"/>
+              <a:t>шагов</a:t>
+            </a:r>
+            <a:r>
+              <a:rPr lang="ru-RU" sz="1400" dirty="0" smtClean="0"/>
+              <a:t> </a:t>
+            </a:r>
+            <a:r>
+              <a:rPr lang="en-US" sz="1400" dirty="0" smtClean="0"/>
+              <a:t>(</a:t>
+            </a:r>
+            <a:r>
+              <a:rPr lang="ru-RU" sz="1400" dirty="0" smtClean="0"/>
+              <a:t>определение 3 и 4</a:t>
+            </a:r>
+            <a:r>
+              <a:rPr lang="en-US" sz="1400" dirty="0" smtClean="0"/>
+              <a:t>)</a:t>
+            </a:r>
+            <a:r>
+              <a:rPr lang="ru-RU" sz="1400" dirty="0" smtClean="0"/>
+              <a:t>;</a:t>
+            </a:r>
+            <a:endParaRPr lang="ru-RU" sz="1400" dirty="0" smtClean="0"/>
+          </a:p>
+          <a:p>
+            <a:pPr fontAlgn="base"/>
+            <a:endParaRPr lang="ru-RU" sz="1400" dirty="0" smtClean="0"/>
+          </a:p>
+          <a:p>
+            <a:pPr fontAlgn="base"/>
+            <a:r>
+              <a:rPr lang="ru-RU" sz="1400" b="1" dirty="0" smtClean="0"/>
+              <a:t>массовость.</a:t>
+            </a:r>
+            <a:r>
+              <a:rPr lang="ru-RU" sz="1400" dirty="0" smtClean="0"/>
+              <a:t> </a:t>
+            </a:r>
+            <a:r>
+              <a:rPr lang="ru-RU" sz="1400" b="1" dirty="0" smtClean="0"/>
+              <a:t>Набор </a:t>
+            </a:r>
+            <a:r>
+              <a:rPr lang="ru-RU" sz="1400" b="1" dirty="0" smtClean="0"/>
+              <a:t>исходных данных</a:t>
+            </a:r>
+            <a:r>
+              <a:rPr lang="ru-RU" sz="1400" dirty="0" smtClean="0"/>
+              <a:t>, на которых алгоритм должен выдавать верное решение</a:t>
+            </a:r>
+            <a:r>
+              <a:rPr lang="ru-RU" sz="1400" b="1" dirty="0" smtClean="0"/>
+              <a:t>, заранее </a:t>
+            </a:r>
+            <a:r>
+              <a:rPr lang="ru-RU" sz="1400" b="1" dirty="0" smtClean="0"/>
+              <a:t>ограничен </a:t>
+            </a:r>
+            <a:r>
+              <a:rPr lang="ru-RU" sz="1400" dirty="0" smtClean="0"/>
+              <a:t>(определения 1, 2, 3);</a:t>
+            </a:r>
+          </a:p>
+          <a:p>
+            <a:pPr fontAlgn="base"/>
+            <a:endParaRPr lang="ru-RU" sz="1400" dirty="0" smtClean="0"/>
+          </a:p>
+          <a:p>
+            <a:pPr fontAlgn="base"/>
+            <a:r>
+              <a:rPr lang="ru-RU" sz="1400" b="1" dirty="0" smtClean="0"/>
+              <a:t>правильность.</a:t>
+            </a:r>
+            <a:r>
+              <a:rPr lang="ru-RU" sz="1400" dirty="0" smtClean="0"/>
+              <a:t> Под правильностью понимается соответствие результатов работы алгоритма условию задачи (определение 1). </a:t>
+            </a:r>
+          </a:p>
+        </p:txBody>
+      </p:sp>
+    </p:spTree>
+  </p:cSld>
+  <p:clrMapOvr>
+    <a:masterClrMapping/>
+  </p:clrMapOvr>
+</p:sld>
+</file>
+
+<file path=ppt/slides/slide4.xml><?xml version="1.0" encoding="utf-8"?>
+<p:sld xmlns:a="http://schemas.openxmlformats.org/drawingml/2006/main" xmlns:r="http://schemas.openxmlformats.org/officeDocument/2006/relationships" xmlns:p="http://schemas.openxmlformats.org/presentationml/2006/main">
+  <p:cSld>
+    <p:spTree>
+      <p:nvGrpSpPr>
+        <p:cNvPr id="1" name=""/>
+        <p:cNvGrpSpPr/>
+        <p:nvPr/>
+      </p:nvGrpSpPr>
+      <p:grpSpPr>
+        <a:xfrm>
+          <a:off x="0" y="0"/>
+          <a:ext cx="0" cy="0"/>
+          <a:chOff x="0" y="0"/>
+          <a:chExt cx="0" cy="0"/>
+        </a:xfrm>
+      </p:grpSpPr>
+      <p:sp>
+        <p:nvSpPr>
+          <p:cNvPr id="2" name="Заголовок 1"/>
+          <p:cNvSpPr>
+            <a:spLocks noGrp="1"/>
+          </p:cNvSpPr>
+          <p:nvPr>
+            <p:ph type="title"/>
+          </p:nvPr>
+        </p:nvSpPr>
+        <p:spPr/>
+        <p:txBody>
+          <a:bodyPr/>
+          <a:lstStyle/>
+          <a:p>
+            <a:r>
+              <a:rPr lang="ru-RU" dirty="0" smtClean="0"/>
+              <a:t>Литература</a:t>
+            </a:r>
+            <a:endParaRPr lang="ru-RU" dirty="0"/>
+          </a:p>
+        </p:txBody>
+      </p:sp>
+      <p:sp>
+        <p:nvSpPr>
+          <p:cNvPr id="3" name="Содержимое 2"/>
+          <p:cNvSpPr>
+            <a:spLocks noGrp="1"/>
+          </p:cNvSpPr>
+          <p:nvPr>
+            <p:ph idx="1"/>
+          </p:nvPr>
+        </p:nvSpPr>
+        <p:spPr>
+          <a:xfrm>
+            <a:off x="214282" y="1200150"/>
+            <a:ext cx="8715436" cy="3943350"/>
+          </a:xfrm>
+        </p:spPr>
+        <p:txBody>
+          <a:bodyPr>
+            <a:normAutofit/>
+          </a:bodyPr>
+          <a:lstStyle/>
+          <a:p>
+            <a:pPr fontAlgn="base">
+              <a:buNone/>
+            </a:pPr>
+            <a:r>
+              <a:rPr lang="ru-RU" sz="1200" dirty="0" smtClean="0"/>
+              <a:t>1. </a:t>
+            </a:r>
+            <a:r>
+              <a:rPr lang="ru-RU" sz="1200" dirty="0" err="1" smtClean="0"/>
+              <a:t>Скиена</a:t>
+            </a:r>
+            <a:r>
+              <a:rPr lang="ru-RU" sz="1200" dirty="0" smtClean="0"/>
+              <a:t> </a:t>
+            </a:r>
+            <a:r>
+              <a:rPr lang="ru-RU" sz="1200" dirty="0" smtClean="0"/>
+              <a:t>С. </a:t>
+            </a:r>
+            <a:r>
+              <a:rPr lang="ru-RU" sz="1200" i="1" dirty="0" smtClean="0"/>
+              <a:t>Алгоритмы. Руководство по разработке</a:t>
+            </a:r>
+            <a:r>
+              <a:rPr lang="ru-RU" sz="1200" dirty="0" smtClean="0"/>
+              <a:t>. </a:t>
+            </a:r>
+            <a:r>
+              <a:rPr lang="ru-RU" sz="1200" i="1" dirty="0" smtClean="0"/>
+              <a:t>2-е изд.: Пер</a:t>
+            </a:r>
+            <a:r>
+              <a:rPr lang="ru-RU" sz="1200" dirty="0" smtClean="0"/>
+              <a:t>. с англ. — СПб.: </a:t>
+            </a:r>
+            <a:r>
+              <a:rPr lang="ru-RU" sz="1200" dirty="0" err="1" smtClean="0"/>
+              <a:t>БХВ-Петербург</a:t>
+            </a:r>
+            <a:r>
+              <a:rPr lang="ru-RU" sz="1200" dirty="0" smtClean="0"/>
+              <a:t>. 2011. — 720 с.: ил.</a:t>
+            </a:r>
+          </a:p>
+          <a:p>
+            <a:pPr fontAlgn="base">
+              <a:buNone/>
+            </a:pPr>
+            <a:r>
+              <a:rPr lang="ru-RU" sz="1200" dirty="0" smtClean="0"/>
+              <a:t>2. ГОСТ </a:t>
+            </a:r>
+            <a:r>
+              <a:rPr lang="ru-RU" sz="1200" dirty="0" smtClean="0"/>
+              <a:t>19781-74. Единая система программной документации. Термины и определения. Утв. пост. Госкомстата № 2051 от </a:t>
+            </a:r>
+            <a:r>
+              <a:rPr lang="ru-RU" sz="1200" dirty="0" smtClean="0"/>
+              <a:t>08.05.08.</a:t>
+            </a:r>
+          </a:p>
+          <a:p>
+            <a:pPr fontAlgn="base">
+              <a:buNone/>
+            </a:pPr>
+            <a:r>
+              <a:rPr lang="ru-RU" sz="1200" i="1" dirty="0" smtClean="0"/>
+              <a:t>3. </a:t>
+            </a:r>
+            <a:r>
+              <a:rPr lang="ru-RU" sz="1200" i="1" dirty="0" err="1" smtClean="0"/>
+              <a:t>Семененко</a:t>
+            </a:r>
+            <a:r>
+              <a:rPr lang="ru-RU" sz="1200" i="1" dirty="0" smtClean="0"/>
+              <a:t> </a:t>
+            </a:r>
+            <a:r>
+              <a:rPr lang="ru-RU" sz="1200" i="1" dirty="0" smtClean="0"/>
+              <a:t>В. А., </a:t>
+            </a:r>
+            <a:r>
+              <a:rPr lang="ru-RU" sz="1200" i="1" dirty="0" err="1" smtClean="0"/>
+              <a:t>Скуратович</a:t>
+            </a:r>
+            <a:r>
+              <a:rPr lang="ru-RU" sz="1200" i="1" dirty="0" smtClean="0"/>
+              <a:t> Э.К. Информатика и вычислительная техника: Учебное пособие. — М</a:t>
+            </a:r>
+            <a:r>
+              <a:rPr lang="ru-RU" sz="1200" dirty="0" smtClean="0"/>
+              <a:t>.: МГИУ, 2006. — 272 с</a:t>
+            </a:r>
+          </a:p>
+          <a:p>
+            <a:pPr fontAlgn="base">
+              <a:buNone/>
+            </a:pPr>
+            <a:r>
+              <a:rPr lang="ru-RU" sz="1200" i="1" dirty="0" smtClean="0"/>
+              <a:t>4. </a:t>
+            </a:r>
+            <a:r>
+              <a:rPr lang="ru-RU" sz="1200" i="1" dirty="0" err="1" smtClean="0"/>
+              <a:t>Paul</a:t>
+            </a:r>
+            <a:r>
+              <a:rPr lang="ru-RU" sz="1200" i="1" dirty="0" smtClean="0"/>
+              <a:t> </a:t>
+            </a:r>
+            <a:r>
+              <a:rPr lang="ru-RU" sz="1200" i="1" dirty="0" smtClean="0"/>
+              <a:t>E. B. </a:t>
+            </a:r>
+            <a:r>
+              <a:rPr lang="ru-RU" sz="1200" i="1" dirty="0" err="1" smtClean="0"/>
+              <a:t>Dictionary</a:t>
+            </a:r>
+            <a:r>
+              <a:rPr lang="ru-RU" sz="1200" i="1" dirty="0" smtClean="0"/>
+              <a:t> </a:t>
+            </a:r>
+            <a:r>
+              <a:rPr lang="ru-RU" sz="1200" i="1" dirty="0" err="1" smtClean="0"/>
+              <a:t>of</a:t>
+            </a:r>
+            <a:r>
+              <a:rPr lang="ru-RU" sz="1200" i="1" dirty="0" smtClean="0"/>
+              <a:t> </a:t>
+            </a:r>
+            <a:r>
+              <a:rPr lang="ru-RU" sz="1200" i="1" dirty="0" err="1" smtClean="0"/>
+              <a:t>Algorithms</a:t>
+            </a:r>
+            <a:r>
+              <a:rPr lang="ru-RU" sz="1200" i="1" dirty="0" smtClean="0"/>
+              <a:t>, </a:t>
+            </a:r>
+            <a:r>
+              <a:rPr lang="ru-RU" sz="1200" i="1" dirty="0" err="1" smtClean="0"/>
+              <a:t>Data</a:t>
+            </a:r>
+            <a:r>
+              <a:rPr lang="ru-RU" sz="1200" i="1" dirty="0" smtClean="0"/>
+              <a:t> </a:t>
+            </a:r>
+            <a:r>
+              <a:rPr lang="ru-RU" sz="1200" i="1" dirty="0" err="1" smtClean="0"/>
+              <a:t>Structures</a:t>
+            </a:r>
+            <a:r>
+              <a:rPr lang="ru-RU" sz="1200" i="1" dirty="0" smtClean="0"/>
+              <a:t>, </a:t>
+            </a:r>
+            <a:r>
+              <a:rPr lang="ru-RU" sz="1200" i="1" dirty="0" err="1" smtClean="0"/>
+              <a:t>and</a:t>
+            </a:r>
+            <a:r>
+              <a:rPr lang="ru-RU" sz="1200" i="1" dirty="0" smtClean="0"/>
+              <a:t> </a:t>
+            </a:r>
+            <a:r>
+              <a:rPr lang="ru-RU" sz="1200" i="1" dirty="0" err="1" smtClean="0"/>
+              <a:t>Problems</a:t>
+            </a:r>
+            <a:r>
+              <a:rPr lang="ru-RU" sz="1200" dirty="0" smtClean="0"/>
+              <a:t>. [Электронный ресурс]/ </a:t>
+            </a:r>
+            <a:r>
+              <a:rPr lang="ru-RU" sz="1200" i="1" dirty="0" err="1" smtClean="0"/>
+              <a:t>Paul</a:t>
+            </a:r>
+            <a:r>
+              <a:rPr lang="ru-RU" sz="1200" i="1" dirty="0" smtClean="0"/>
+              <a:t> E. B. – режим доступа: </a:t>
+            </a:r>
+            <a:r>
+              <a:rPr lang="ru-RU" sz="1200" dirty="0" smtClean="0"/>
+              <a:t>https://xlinux.nist.gov/dads/HTML/algorithm.html. Дата обращения: 07.05.2017.</a:t>
+            </a:r>
+          </a:p>
+          <a:p>
+            <a:pPr fontAlgn="base">
+              <a:buNone/>
+            </a:pPr>
+            <a:r>
+              <a:rPr lang="ru-RU" sz="1200" dirty="0" smtClean="0"/>
+              <a:t>5. Елабуга</a:t>
+            </a:r>
+            <a:r>
+              <a:rPr lang="ru-RU" sz="1200" dirty="0" smtClean="0"/>
+              <a:t>: изд-во </a:t>
+            </a:r>
+            <a:r>
+              <a:rPr lang="ru-RU" sz="1200" i="1" dirty="0" smtClean="0"/>
+              <a:t>ЕГПУ</a:t>
+            </a:r>
+            <a:r>
+              <a:rPr lang="ru-RU" sz="1200" dirty="0" smtClean="0"/>
+              <a:t>, 2009.- 72 с. 97 . </a:t>
+            </a:r>
+            <a:r>
+              <a:rPr lang="ru-RU" sz="1200" i="1" dirty="0" smtClean="0"/>
+              <a:t>Лизунова</a:t>
+            </a:r>
+            <a:r>
+              <a:rPr lang="ru-RU" sz="1200" dirty="0" smtClean="0"/>
+              <a:t> Е.М. </a:t>
+            </a:r>
+            <a:r>
+              <a:rPr lang="ru-RU" sz="1200" i="1" dirty="0" smtClean="0"/>
+              <a:t>Теория алгоритмов</a:t>
+            </a:r>
+            <a:r>
+              <a:rPr lang="ru-RU" sz="1200" dirty="0" smtClean="0"/>
+              <a:t>. Лекции 2007</a:t>
+            </a:r>
+          </a:p>
+          <a:p>
+            <a:pPr fontAlgn="base">
+              <a:buNone/>
+            </a:pPr>
+            <a:endParaRPr lang="ru-RU" sz="1200" dirty="0" smtClean="0"/>
+          </a:p>
+        </p:txBody>
+      </p:sp>
+    </p:spTree>
+  </p:cSld>
+  <p:clrMapOvr>
+    <a:masterClrMapping/>
+  </p:clrMapOvr>
+</p:sld>
 </file>
 
 <file path=ppt/theme/theme1.xml><?xml version="1.0" encoding="utf-8"?>

</xml_diff>